<commit_message>
Adds slides for hooks and assertions
</commit_message>
<xml_diff>
--- a/slides/Selenium Cucumber.pptx
+++ b/slides/Selenium Cucumber.pptx
@@ -5,7 +5,7 @@
     <p:sldMasterId id="2147483664" r:id="rId1"/>
   </p:sldMasterIdLst>
   <p:notesMasterIdLst>
-    <p:notesMasterId r:id="rId11"/>
+    <p:notesMasterId r:id="rId13"/>
   </p:notesMasterIdLst>
   <p:sldIdLst>
     <p:sldId id="256" r:id="rId2"/>
@@ -15,8 +15,10 @@
     <p:sldId id="284" r:id="rId6"/>
     <p:sldId id="285" r:id="rId7"/>
     <p:sldId id="287" r:id="rId8"/>
-    <p:sldId id="286" r:id="rId9"/>
-    <p:sldId id="288" r:id="rId10"/>
+    <p:sldId id="290" r:id="rId9"/>
+    <p:sldId id="286" r:id="rId10"/>
+    <p:sldId id="288" r:id="rId11"/>
+    <p:sldId id="289" r:id="rId12"/>
   </p:sldIdLst>
   <p:sldSz cx="12192000" cy="6858000"/>
   <p:notesSz cx="6858000" cy="9144000"/>
@@ -1242,8 +1244,12 @@
         <a:lstStyle/>
         <a:p>
           <a:r>
+            <a:rPr lang="en-US" dirty="0" err="1"/>
+            <a:t>Instrucciones</a:t>
+          </a:r>
+          <a:r>
             <a:rPr lang="en-US" dirty="0"/>
-            <a:t>(Page Objects)</a:t>
+            <a:t> de Selenium</a:t>
           </a:r>
         </a:p>
       </dgm:t>
@@ -1260,78 +1266,6 @@
       </dgm:t>
     </dgm:pt>
     <dgm:pt modelId="{DBB89A2B-F727-4886-A1F3-F7CF4767DCF3}" type="sibTrans" cxnId="{A061A52B-8EBF-4AFF-95C1-1D4AFBFFB727}">
-      <dgm:prSet/>
-      <dgm:spPr/>
-      <dgm:t>
-        <a:bodyPr/>
-        <a:lstStyle/>
-        <a:p>
-          <a:endParaRPr lang="en-US"/>
-        </a:p>
-      </dgm:t>
-    </dgm:pt>
-    <dgm:pt modelId="{688FFBB9-25C3-47CA-AB16-E813D5025F06}">
-      <dgm:prSet phldrT="[Texto]"/>
-      <dgm:spPr/>
-      <dgm:t>
-        <a:bodyPr/>
-        <a:lstStyle/>
-        <a:p>
-          <a:r>
-            <a:rPr lang="en-US" dirty="0"/>
-            <a:t>Selenium</a:t>
-          </a:r>
-        </a:p>
-      </dgm:t>
-    </dgm:pt>
-    <dgm:pt modelId="{13792E2B-60B6-4810-B34E-DDCFC591C7E4}" type="parTrans" cxnId="{CAA2ECF1-F3A6-461D-99AE-2ADA86CBE7C3}">
-      <dgm:prSet/>
-      <dgm:spPr/>
-      <dgm:t>
-        <a:bodyPr/>
-        <a:lstStyle/>
-        <a:p>
-          <a:endParaRPr lang="en-US"/>
-        </a:p>
-      </dgm:t>
-    </dgm:pt>
-    <dgm:pt modelId="{FB2BA11B-7D89-4AAC-863F-085CA37DB3CC}" type="sibTrans" cxnId="{CAA2ECF1-F3A6-461D-99AE-2ADA86CBE7C3}">
-      <dgm:prSet/>
-      <dgm:spPr/>
-      <dgm:t>
-        <a:bodyPr/>
-        <a:lstStyle/>
-        <a:p>
-          <a:endParaRPr lang="en-US"/>
-        </a:p>
-      </dgm:t>
-    </dgm:pt>
-    <dgm:pt modelId="{061FD5B8-022E-40F3-A1C4-4CA0CE86E12D}">
-      <dgm:prSet phldrT="[Texto]"/>
-      <dgm:spPr/>
-      <dgm:t>
-        <a:bodyPr/>
-        <a:lstStyle/>
-        <a:p>
-          <a:r>
-            <a:rPr lang="en-US" dirty="0"/>
-            <a:t>Page Objects</a:t>
-          </a:r>
-        </a:p>
-      </dgm:t>
-    </dgm:pt>
-    <dgm:pt modelId="{08F237D2-539D-41EE-AFFF-5F13F5E30C1A}" type="parTrans" cxnId="{275EE11D-808F-4DCB-8FE3-ECA29DF89BC4}">
-      <dgm:prSet/>
-      <dgm:spPr/>
-      <dgm:t>
-        <a:bodyPr/>
-        <a:lstStyle/>
-        <a:p>
-          <a:endParaRPr lang="en-US"/>
-        </a:p>
-      </dgm:t>
-    </dgm:pt>
-    <dgm:pt modelId="{AA9AA982-AF7C-4C08-B211-5570516BB8DA}" type="sibTrans" cxnId="{275EE11D-808F-4DCB-8FE3-ECA29DF89BC4}">
       <dgm:prSet/>
       <dgm:spPr/>
       <dgm:t>
@@ -1379,6 +1313,186 @@
         </a:p>
       </dgm:t>
     </dgm:pt>
+    <dgm:pt modelId="{F21B89B2-CBD3-48B7-A930-17EFBC72A14D}">
+      <dgm:prSet phldrT="[Texto]"/>
+      <dgm:spPr/>
+      <dgm:t>
+        <a:bodyPr/>
+        <a:lstStyle/>
+        <a:p>
+          <a:r>
+            <a:rPr lang="en-US" dirty="0" err="1"/>
+            <a:t>Patrones</a:t>
+          </a:r>
+          <a:r>
+            <a:rPr lang="en-US" dirty="0"/>
+            <a:t> de </a:t>
+          </a:r>
+          <a:r>
+            <a:rPr lang="en-US" dirty="0" err="1"/>
+            <a:t>Dise</a:t>
+          </a:r>
+          <a:r>
+            <a:rPr lang="es-MX" dirty="0" err="1"/>
+            <a:t>ño</a:t>
+          </a:r>
+          <a:r>
+            <a:rPr lang="es-MX" dirty="0"/>
+            <a:t> específicos</a:t>
+          </a:r>
+          <a:endParaRPr lang="en-US" dirty="0"/>
+        </a:p>
+      </dgm:t>
+    </dgm:pt>
+    <dgm:pt modelId="{C07B38BE-289A-4FB0-AC55-4B4D1B4E31AB}" type="parTrans" cxnId="{C5FD98C2-34A3-4393-AB61-443E21343E6C}">
+      <dgm:prSet/>
+      <dgm:spPr/>
+      <dgm:t>
+        <a:bodyPr/>
+        <a:lstStyle/>
+        <a:p>
+          <a:endParaRPr lang="en-US"/>
+        </a:p>
+      </dgm:t>
+    </dgm:pt>
+    <dgm:pt modelId="{B73EEBC7-36A3-48BD-A3E9-44A18CB340E4}" type="sibTrans" cxnId="{C5FD98C2-34A3-4393-AB61-443E21343E6C}">
+      <dgm:prSet/>
+      <dgm:spPr/>
+      <dgm:t>
+        <a:bodyPr/>
+        <a:lstStyle/>
+        <a:p>
+          <a:endParaRPr lang="en-US"/>
+        </a:p>
+      </dgm:t>
+    </dgm:pt>
+    <dgm:pt modelId="{AF42405B-52A8-40D7-8F5E-BA86AACBF6B3}">
+      <dgm:prSet phldrT="[Texto]"/>
+      <dgm:spPr/>
+      <dgm:t>
+        <a:bodyPr/>
+        <a:lstStyle/>
+        <a:p>
+          <a:r>
+            <a:rPr lang="es-MX" dirty="0"/>
+            <a:t>Abrir</a:t>
+          </a:r>
+          <a:r>
+            <a:rPr lang="es-MX"/>
+            <a:t>/Cerrar </a:t>
+          </a:r>
+          <a:r>
+            <a:rPr lang="es-MX" dirty="0"/>
+            <a:t>Browser</a:t>
+          </a:r>
+          <a:endParaRPr lang="en-US" dirty="0"/>
+        </a:p>
+      </dgm:t>
+    </dgm:pt>
+    <dgm:pt modelId="{E6331FD7-5CA9-4E8F-B65E-ED6C26086A33}" type="parTrans" cxnId="{804FD07E-12ED-48E1-AD37-E0844DE4AE83}">
+      <dgm:prSet/>
+      <dgm:spPr/>
+      <dgm:t>
+        <a:bodyPr/>
+        <a:lstStyle/>
+        <a:p>
+          <a:endParaRPr lang="en-US"/>
+        </a:p>
+      </dgm:t>
+    </dgm:pt>
+    <dgm:pt modelId="{5787EB70-C140-4C7C-B725-D55D22F2C0D0}" type="sibTrans" cxnId="{804FD07E-12ED-48E1-AD37-E0844DE4AE83}">
+      <dgm:prSet/>
+      <dgm:spPr/>
+      <dgm:t>
+        <a:bodyPr/>
+        <a:lstStyle/>
+        <a:p>
+          <a:endParaRPr lang="en-US"/>
+        </a:p>
+      </dgm:t>
+    </dgm:pt>
+    <dgm:pt modelId="{1405BAA2-0167-4ED6-A375-2594A1F8FD4B}">
+      <dgm:prSet phldrT="[Texto]"/>
+      <dgm:spPr/>
+      <dgm:t>
+        <a:bodyPr/>
+        <a:lstStyle/>
+        <a:p>
+          <a:r>
+            <a:rPr lang="es-MX" dirty="0"/>
+            <a:t>Manipular </a:t>
+          </a:r>
+          <a:r>
+            <a:rPr lang="es-MX" dirty="0" err="1"/>
+            <a:t>WebElements</a:t>
+          </a:r>
+          <a:endParaRPr lang="en-US" dirty="0"/>
+        </a:p>
+      </dgm:t>
+    </dgm:pt>
+    <dgm:pt modelId="{78B9118C-3E29-4A6E-BEC1-EFE7EC176B87}" type="parTrans" cxnId="{1A369092-05AE-4C2C-B2BA-B093DFA48165}">
+      <dgm:prSet/>
+      <dgm:spPr/>
+      <dgm:t>
+        <a:bodyPr/>
+        <a:lstStyle/>
+        <a:p>
+          <a:endParaRPr lang="en-US"/>
+        </a:p>
+      </dgm:t>
+    </dgm:pt>
+    <dgm:pt modelId="{9E471F96-2A1A-4E48-AF41-5D8CC0C14660}" type="sibTrans" cxnId="{1A369092-05AE-4C2C-B2BA-B093DFA48165}">
+      <dgm:prSet/>
+      <dgm:spPr/>
+      <dgm:t>
+        <a:bodyPr/>
+        <a:lstStyle/>
+        <a:p>
+          <a:endParaRPr lang="en-US"/>
+        </a:p>
+      </dgm:t>
+    </dgm:pt>
+    <dgm:pt modelId="{231162CC-EF36-4F86-9C38-991ADCEDE9FD}">
+      <dgm:prSet phldrT="[Texto]"/>
+      <dgm:spPr/>
+      <dgm:t>
+        <a:bodyPr/>
+        <a:lstStyle/>
+        <a:p>
+          <a:r>
+            <a:rPr lang="es-MX" dirty="0"/>
+            <a:t>Validar </a:t>
+          </a:r>
+          <a:r>
+            <a:rPr lang="es-MX" dirty="0" err="1"/>
+            <a:t>WebElements</a:t>
+          </a:r>
+          <a:endParaRPr lang="en-US" dirty="0"/>
+        </a:p>
+      </dgm:t>
+    </dgm:pt>
+    <dgm:pt modelId="{9997082A-71F0-4C42-9F8E-1850DC4CFFA1}" type="parTrans" cxnId="{3ACAA3FD-B3A9-4CF2-872E-4B22E8091E26}">
+      <dgm:prSet/>
+      <dgm:spPr/>
+      <dgm:t>
+        <a:bodyPr/>
+        <a:lstStyle/>
+        <a:p>
+          <a:endParaRPr lang="en-US"/>
+        </a:p>
+      </dgm:t>
+    </dgm:pt>
+    <dgm:pt modelId="{FCE163FB-10D4-4E77-9ED7-2C7C32DC9EBC}" type="sibTrans" cxnId="{3ACAA3FD-B3A9-4CF2-872E-4B22E8091E26}">
+      <dgm:prSet/>
+      <dgm:spPr/>
+      <dgm:t>
+        <a:bodyPr/>
+        <a:lstStyle/>
+        <a:p>
+          <a:endParaRPr lang="en-US"/>
+        </a:p>
+      </dgm:t>
+    </dgm:pt>
     <dgm:pt modelId="{08CEF240-44DC-40A9-8C79-C6B4D4F4EE21}" type="pres">
       <dgm:prSet presAssocID="{6973ECED-F389-4BC7-BC7B-43A4175C3EF3}" presName="linear" presStyleCnt="0">
         <dgm:presLayoutVars>
@@ -1389,7 +1503,7 @@
       <dgm:spPr/>
     </dgm:pt>
     <dgm:pt modelId="{6D36927C-2121-463F-A79E-34D90B8C2648}" type="pres">
-      <dgm:prSet presAssocID="{FDA05E83-98CF-436A-8FD8-BCE3DE28CA6D}" presName="parentText" presStyleLbl="node1" presStyleIdx="0" presStyleCnt="4">
+      <dgm:prSet presAssocID="{FDA05E83-98CF-436A-8FD8-BCE3DE28CA6D}" presName="parentText" presStyleLbl="node1" presStyleIdx="0" presStyleCnt="3">
         <dgm:presLayoutVars>
           <dgm:chMax val="0"/>
           <dgm:bulletEnabled val="1"/>
@@ -1406,7 +1520,7 @@
       <dgm:spPr/>
     </dgm:pt>
     <dgm:pt modelId="{251BEA11-C33B-4F72-A680-1C654876154D}" type="pres">
-      <dgm:prSet presAssocID="{EEFCAB40-C007-4920-9AE1-73E1EB732CA4}" presName="parentText" presStyleLbl="node1" presStyleIdx="1" presStyleCnt="4">
+      <dgm:prSet presAssocID="{EEFCAB40-C007-4920-9AE1-73E1EB732CA4}" presName="parentText" presStyleLbl="node1" presStyleIdx="1" presStyleCnt="3">
         <dgm:presLayoutVars>
           <dgm:chMax val="0"/>
           <dgm:bulletEnabled val="1"/>
@@ -1422,8 +1536,8 @@
       </dgm:prSet>
       <dgm:spPr/>
     </dgm:pt>
-    <dgm:pt modelId="{7EB3552E-28B8-407C-83A8-989B77563EF8}" type="pres">
-      <dgm:prSet presAssocID="{688FFBB9-25C3-47CA-AB16-E813D5025F06}" presName="parentText" presStyleLbl="node1" presStyleIdx="2" presStyleCnt="4">
+    <dgm:pt modelId="{2C9232E3-5841-4541-B8CE-6E37C598E52A}" type="pres">
+      <dgm:prSet presAssocID="{4A256602-9CE5-42DE-93A5-6EB8D75C22E7}" presName="parentText" presStyleLbl="node1" presStyleIdx="2" presStyleCnt="3">
         <dgm:presLayoutVars>
           <dgm:chMax val="0"/>
           <dgm:bulletEnabled val="1"/>
@@ -1431,18 +1545,9 @@
       </dgm:prSet>
       <dgm:spPr/>
     </dgm:pt>
-    <dgm:pt modelId="{9BAA238A-4C5D-4FF9-9B8C-893B575E6B50}" type="pres">
-      <dgm:prSet presAssocID="{688FFBB9-25C3-47CA-AB16-E813D5025F06}" presName="childText" presStyleLbl="revTx" presStyleIdx="2" presStyleCnt="3">
+    <dgm:pt modelId="{A4AD1765-0261-4FB8-87AD-4C7C9C13670C}" type="pres">
+      <dgm:prSet presAssocID="{4A256602-9CE5-42DE-93A5-6EB8D75C22E7}" presName="childText" presStyleLbl="revTx" presStyleIdx="2" presStyleCnt="3">
         <dgm:presLayoutVars>
-          <dgm:bulletEnabled val="1"/>
-        </dgm:presLayoutVars>
-      </dgm:prSet>
-      <dgm:spPr/>
-    </dgm:pt>
-    <dgm:pt modelId="{2C9232E3-5841-4541-B8CE-6E37C598E52A}" type="pres">
-      <dgm:prSet presAssocID="{4A256602-9CE5-42DE-93A5-6EB8D75C22E7}" presName="parentText" presStyleLbl="node1" presStyleIdx="3" presStyleCnt="4">
-        <dgm:presLayoutVars>
-          <dgm:chMax val="0"/>
           <dgm:bulletEnabled val="1"/>
         </dgm:presLayoutVars>
       </dgm:prSet>
@@ -1450,34 +1555,37 @@
     </dgm:pt>
   </dgm:ptLst>
   <dgm:cxnLst>
-    <dgm:cxn modelId="{2BC69B01-B8FA-4A85-96CD-278E3EAD903E}" type="presOf" srcId="{688FFBB9-25C3-47CA-AB16-E813D5025F06}" destId="{7EB3552E-28B8-407C-83A8-989B77563EF8}" srcOrd="0" destOrd="0" presId="urn:microsoft.com/office/officeart/2005/8/layout/vList2"/>
+    <dgm:cxn modelId="{36402604-A514-4832-B3F3-65E872F413DE}" type="presOf" srcId="{1405BAA2-0167-4ED6-A375-2594A1F8FD4B}" destId="{A4AD1765-0261-4FB8-87AD-4C7C9C13670C}" srcOrd="0" destOrd="1" presId="urn:microsoft.com/office/officeart/2005/8/layout/vList2"/>
     <dgm:cxn modelId="{1FFA2604-EF1A-47B7-8F96-5F0CCBBF6974}" srcId="{EEFCAB40-C007-4920-9AE1-73E1EB732CA4}" destId="{5C88D390-EE85-43B7-A59E-934427915E78}" srcOrd="0" destOrd="0" parTransId="{0FBB772D-BD47-4F3F-B1F9-C38C8380133C}" sibTransId="{FD991142-33EE-42A3-AA54-FDCB15DC64CF}"/>
-    <dgm:cxn modelId="{275EE11D-808F-4DCB-8FE3-ECA29DF89BC4}" srcId="{688FFBB9-25C3-47CA-AB16-E813D5025F06}" destId="{061FD5B8-022E-40F3-A1C4-4CA0CE86E12D}" srcOrd="0" destOrd="0" parTransId="{08F237D2-539D-41EE-AFFF-5F13F5E30C1A}" sibTransId="{AA9AA982-AF7C-4C08-B211-5570516BB8DA}"/>
     <dgm:cxn modelId="{A061A52B-8EBF-4AFF-95C1-1D4AFBFFB727}" srcId="{EEFCAB40-C007-4920-9AE1-73E1EB732CA4}" destId="{4DC13D98-E593-42A4-AA29-6A9E36586A4F}" srcOrd="1" destOrd="0" parTransId="{4BD0F9A6-1C72-430A-B159-1C96A469EB8D}" sibTransId="{DBB89A2B-F727-4886-A1F3-F7CF4767DCF3}"/>
-    <dgm:cxn modelId="{2CC4E631-3A11-4DE6-9402-578CEDAAD301}" srcId="{6973ECED-F389-4BC7-BC7B-43A4175C3EF3}" destId="{4A256602-9CE5-42DE-93A5-6EB8D75C22E7}" srcOrd="3" destOrd="0" parTransId="{CA0C083D-3B25-423C-BDAA-04E2D9C7841B}" sibTransId="{FA1F3F2A-890F-4E8E-A1E3-81493A7ABAA6}"/>
+    <dgm:cxn modelId="{2CC4E631-3A11-4DE6-9402-578CEDAAD301}" srcId="{6973ECED-F389-4BC7-BC7B-43A4175C3EF3}" destId="{4A256602-9CE5-42DE-93A5-6EB8D75C22E7}" srcOrd="2" destOrd="0" parTransId="{CA0C083D-3B25-423C-BDAA-04E2D9C7841B}" sibTransId="{FA1F3F2A-890F-4E8E-A1E3-81493A7ABAA6}"/>
     <dgm:cxn modelId="{5D7F0D5D-0DD7-4503-B830-AE9BCF98DD43}" type="presOf" srcId="{9506FEE9-886B-461E-AF5D-51BD330CF9FD}" destId="{FD6F4898-D406-4525-8C27-F44675667C14}" srcOrd="0" destOrd="0" presId="urn:microsoft.com/office/officeart/2005/8/layout/vList2"/>
+    <dgm:cxn modelId="{566AAC5F-5421-4AA5-B7F1-19EC07A4BC98}" type="presOf" srcId="{AF42405B-52A8-40D7-8F5E-BA86AACBF6B3}" destId="{A4AD1765-0261-4FB8-87AD-4C7C9C13670C}" srcOrd="0" destOrd="0" presId="urn:microsoft.com/office/officeart/2005/8/layout/vList2"/>
     <dgm:cxn modelId="{8BADB55F-E164-4153-9EB7-822E009550B7}" srcId="{FDA05E83-98CF-436A-8FD8-BCE3DE28CA6D}" destId="{9506FEE9-886B-461E-AF5D-51BD330CF9FD}" srcOrd="0" destOrd="0" parTransId="{67B4EFB8-A139-4550-82DE-33DC06E13930}" sibTransId="{D8041748-624F-4B7D-B3F7-F8AA9CB58031}"/>
     <dgm:cxn modelId="{1151286E-9679-4F14-93D2-0812937D663C}" type="presOf" srcId="{FDA05E83-98CF-436A-8FD8-BCE3DE28CA6D}" destId="{6D36927C-2121-463F-A79E-34D90B8C2648}" srcOrd="0" destOrd="0" presId="urn:microsoft.com/office/officeart/2005/8/layout/vList2"/>
     <dgm:cxn modelId="{2B76636E-226F-4FAA-8D84-BE877B324863}" srcId="{6973ECED-F389-4BC7-BC7B-43A4175C3EF3}" destId="{FDA05E83-98CF-436A-8FD8-BCE3DE28CA6D}" srcOrd="0" destOrd="0" parTransId="{32A92325-A178-4957-86F2-000A4D8A3652}" sibTransId="{1960269F-4229-471F-9A89-247DB8EACF39}"/>
     <dgm:cxn modelId="{FD7CCF58-009A-458C-88FD-A83966623BB0}" type="presOf" srcId="{EEFCAB40-C007-4920-9AE1-73E1EB732CA4}" destId="{251BEA11-C33B-4F72-A680-1C654876154D}" srcOrd="0" destOrd="0" presId="urn:microsoft.com/office/officeart/2005/8/layout/vList2"/>
     <dgm:cxn modelId="{CA440B7A-70FB-40D1-AC5B-E52349FA5FBD}" srcId="{6973ECED-F389-4BC7-BC7B-43A4175C3EF3}" destId="{EEFCAB40-C007-4920-9AE1-73E1EB732CA4}" srcOrd="1" destOrd="0" parTransId="{FF9F6036-8668-411C-B424-C972EC70C8E3}" sibTransId="{CE803584-56EC-425C-8859-A64168DF6531}"/>
+    <dgm:cxn modelId="{804FD07E-12ED-48E1-AD37-E0844DE4AE83}" srcId="{4A256602-9CE5-42DE-93A5-6EB8D75C22E7}" destId="{AF42405B-52A8-40D7-8F5E-BA86AACBF6B3}" srcOrd="0" destOrd="0" parTransId="{E6331FD7-5CA9-4E8F-B65E-ED6C26086A33}" sibTransId="{5787EB70-C140-4C7C-B725-D55D22F2C0D0}"/>
     <dgm:cxn modelId="{14B5A790-6F56-4C37-9C92-2B7B4E6E533B}" type="presOf" srcId="{6973ECED-F389-4BC7-BC7B-43A4175C3EF3}" destId="{08CEF240-44DC-40A9-8C79-C6B4D4F4EE21}" srcOrd="0" destOrd="0" presId="urn:microsoft.com/office/officeart/2005/8/layout/vList2"/>
+    <dgm:cxn modelId="{1A369092-05AE-4C2C-B2BA-B093DFA48165}" srcId="{4A256602-9CE5-42DE-93A5-6EB8D75C22E7}" destId="{1405BAA2-0167-4ED6-A375-2594A1F8FD4B}" srcOrd="1" destOrd="0" parTransId="{78B9118C-3E29-4A6E-BEC1-EFE7EC176B87}" sibTransId="{9E471F96-2A1A-4E48-AF41-5D8CC0C14660}"/>
     <dgm:cxn modelId="{DB97F596-DB0D-4EE0-8209-4A38A294A36F}" type="presOf" srcId="{4DC13D98-E593-42A4-AA29-6A9E36586A4F}" destId="{F3C96160-65C9-4C60-966E-D24F33455ECD}" srcOrd="0" destOrd="1" presId="urn:microsoft.com/office/officeart/2005/8/layout/vList2"/>
-    <dgm:cxn modelId="{F54AC0A0-0179-495F-B7DD-33EC2417E870}" type="presOf" srcId="{061FD5B8-022E-40F3-A1C4-4CA0CE86E12D}" destId="{9BAA238A-4C5D-4FF9-9B8C-893B575E6B50}" srcOrd="0" destOrd="0" presId="urn:microsoft.com/office/officeart/2005/8/layout/vList2"/>
     <dgm:cxn modelId="{7CF7C4B2-6617-477E-A9F2-3E31DBBEE53A}" srcId="{FDA05E83-98CF-436A-8FD8-BCE3DE28CA6D}" destId="{153C32E6-90CB-4AD4-8903-78656F01135B}" srcOrd="2" destOrd="0" parTransId="{DA0CFCEE-7524-4935-AAFA-3A9AC469FFB4}" sibTransId="{838E7781-04C8-4B24-AC58-9A01B297B20C}"/>
     <dgm:cxn modelId="{4A6021B3-8AB3-4C54-9681-08EC8FB93570}" type="presOf" srcId="{153C32E6-90CB-4AD4-8903-78656F01135B}" destId="{FD6F4898-D406-4525-8C27-F44675667C14}" srcOrd="0" destOrd="2" presId="urn:microsoft.com/office/officeart/2005/8/layout/vList2"/>
+    <dgm:cxn modelId="{C5FD98C2-34A3-4393-AB61-443E21343E6C}" srcId="{EEFCAB40-C007-4920-9AE1-73E1EB732CA4}" destId="{F21B89B2-CBD3-48B7-A930-17EFBC72A14D}" srcOrd="2" destOrd="0" parTransId="{C07B38BE-289A-4FB0-AC55-4B4D1B4E31AB}" sibTransId="{B73EEBC7-36A3-48BD-A3E9-44A18CB340E4}"/>
+    <dgm:cxn modelId="{025768C8-2618-4284-8CCA-B36778C7DC66}" type="presOf" srcId="{F21B89B2-CBD3-48B7-A930-17EFBC72A14D}" destId="{F3C96160-65C9-4C60-966E-D24F33455ECD}" srcOrd="0" destOrd="2" presId="urn:microsoft.com/office/officeart/2005/8/layout/vList2"/>
     <dgm:cxn modelId="{1D5A95CC-2294-4A0C-9D33-DC3F22E9547E}" type="presOf" srcId="{4A256602-9CE5-42DE-93A5-6EB8D75C22E7}" destId="{2C9232E3-5841-4541-B8CE-6E37C598E52A}" srcOrd="0" destOrd="0" presId="urn:microsoft.com/office/officeart/2005/8/layout/vList2"/>
     <dgm:cxn modelId="{B786B8CF-1E60-4563-92BA-5F9ADC063DFD}" type="presOf" srcId="{5C88D390-EE85-43B7-A59E-934427915E78}" destId="{F3C96160-65C9-4C60-966E-D24F33455ECD}" srcOrd="0" destOrd="0" presId="urn:microsoft.com/office/officeart/2005/8/layout/vList2"/>
     <dgm:cxn modelId="{724210D3-E2CC-4B0A-954F-8D1459BB886E}" srcId="{FDA05E83-98CF-436A-8FD8-BCE3DE28CA6D}" destId="{3604835A-A2D5-4E0C-88B4-83195E3634BF}" srcOrd="1" destOrd="0" parTransId="{9C3D83B3-29D5-4632-B0C1-E3162439EE6D}" sibTransId="{F8326881-E6D3-4E8A-9878-5AE094893726}"/>
     <dgm:cxn modelId="{31BB11D7-706D-4C09-8DBA-34C62CF8DE3B}" type="presOf" srcId="{3604835A-A2D5-4E0C-88B4-83195E3634BF}" destId="{FD6F4898-D406-4525-8C27-F44675667C14}" srcOrd="0" destOrd="1" presId="urn:microsoft.com/office/officeart/2005/8/layout/vList2"/>
-    <dgm:cxn modelId="{CAA2ECF1-F3A6-461D-99AE-2ADA86CBE7C3}" srcId="{6973ECED-F389-4BC7-BC7B-43A4175C3EF3}" destId="{688FFBB9-25C3-47CA-AB16-E813D5025F06}" srcOrd="2" destOrd="0" parTransId="{13792E2B-60B6-4810-B34E-DDCFC591C7E4}" sibTransId="{FB2BA11B-7D89-4AAC-863F-085CA37DB3CC}"/>
+    <dgm:cxn modelId="{173138EB-89E4-4F46-979E-365ED08513B3}" type="presOf" srcId="{231162CC-EF36-4F86-9C38-991ADCEDE9FD}" destId="{A4AD1765-0261-4FB8-87AD-4C7C9C13670C}" srcOrd="0" destOrd="2" presId="urn:microsoft.com/office/officeart/2005/8/layout/vList2"/>
+    <dgm:cxn modelId="{3ACAA3FD-B3A9-4CF2-872E-4B22E8091E26}" srcId="{4A256602-9CE5-42DE-93A5-6EB8D75C22E7}" destId="{231162CC-EF36-4F86-9C38-991ADCEDE9FD}" srcOrd="2" destOrd="0" parTransId="{9997082A-71F0-4C42-9F8E-1850DC4CFFA1}" sibTransId="{FCE163FB-10D4-4E77-9ED7-2C7C32DC9EBC}"/>
     <dgm:cxn modelId="{CA40372B-3A37-46D2-AEFB-0E6EBBD352A5}" type="presParOf" srcId="{08CEF240-44DC-40A9-8C79-C6B4D4F4EE21}" destId="{6D36927C-2121-463F-A79E-34D90B8C2648}" srcOrd="0" destOrd="0" presId="urn:microsoft.com/office/officeart/2005/8/layout/vList2"/>
     <dgm:cxn modelId="{222CD2D1-1948-40CD-9176-B15DD429D230}" type="presParOf" srcId="{08CEF240-44DC-40A9-8C79-C6B4D4F4EE21}" destId="{FD6F4898-D406-4525-8C27-F44675667C14}" srcOrd="1" destOrd="0" presId="urn:microsoft.com/office/officeart/2005/8/layout/vList2"/>
     <dgm:cxn modelId="{B572F49A-621A-43FC-A301-3543E8D83291}" type="presParOf" srcId="{08CEF240-44DC-40A9-8C79-C6B4D4F4EE21}" destId="{251BEA11-C33B-4F72-A680-1C654876154D}" srcOrd="2" destOrd="0" presId="urn:microsoft.com/office/officeart/2005/8/layout/vList2"/>
     <dgm:cxn modelId="{4D3401A0-480B-494B-95FA-2A35DB6CC59A}" type="presParOf" srcId="{08CEF240-44DC-40A9-8C79-C6B4D4F4EE21}" destId="{F3C96160-65C9-4C60-966E-D24F33455ECD}" srcOrd="3" destOrd="0" presId="urn:microsoft.com/office/officeart/2005/8/layout/vList2"/>
-    <dgm:cxn modelId="{AEC3F814-3116-41CE-B128-9F5744743C27}" type="presParOf" srcId="{08CEF240-44DC-40A9-8C79-C6B4D4F4EE21}" destId="{7EB3552E-28B8-407C-83A8-989B77563EF8}" srcOrd="4" destOrd="0" presId="urn:microsoft.com/office/officeart/2005/8/layout/vList2"/>
-    <dgm:cxn modelId="{2BF63DFD-4FF4-4140-B24C-82A2028DBF0E}" type="presParOf" srcId="{08CEF240-44DC-40A9-8C79-C6B4D4F4EE21}" destId="{9BAA238A-4C5D-4FF9-9B8C-893B575E6B50}" srcOrd="5" destOrd="0" presId="urn:microsoft.com/office/officeart/2005/8/layout/vList2"/>
-    <dgm:cxn modelId="{03592CCC-6D48-4AA6-9ACB-8AF96A85488C}" type="presParOf" srcId="{08CEF240-44DC-40A9-8C79-C6B4D4F4EE21}" destId="{2C9232E3-5841-4541-B8CE-6E37C598E52A}" srcOrd="6" destOrd="0" presId="urn:microsoft.com/office/officeart/2005/8/layout/vList2"/>
+    <dgm:cxn modelId="{03592CCC-6D48-4AA6-9ACB-8AF96A85488C}" type="presParOf" srcId="{08CEF240-44DC-40A9-8C79-C6B4D4F4EE21}" destId="{2C9232E3-5841-4541-B8CE-6E37C598E52A}" srcOrd="4" destOrd="0" presId="urn:microsoft.com/office/officeart/2005/8/layout/vList2"/>
+    <dgm:cxn modelId="{AC05D2D0-FA4E-4D87-8EDA-64585625A1B2}" type="presParOf" srcId="{08CEF240-44DC-40A9-8C79-C6B4D4F4EE21}" destId="{A4AD1765-0261-4FB8-87AD-4C7C9C13670C}" srcOrd="5" destOrd="0" presId="urn:microsoft.com/office/officeart/2005/8/layout/vList2"/>
   </dgm:cxnLst>
   <dgm:bg/>
   <dgm:whole/>
@@ -1504,8 +1612,8 @@
       </dsp:nvSpPr>
       <dsp:spPr>
         <a:xfrm>
-          <a:off x="0" y="12382"/>
-          <a:ext cx="7242002" cy="585000"/>
+          <a:off x="0" y="82436"/>
+          <a:ext cx="7242002" cy="538200"/>
         </a:xfrm>
         <a:prstGeom prst="roundRect">
           <a:avLst/>
@@ -1546,12 +1654,12 @@
         </a:fontRef>
       </dsp:style>
       <dsp:txBody>
-        <a:bodyPr spcFirstLastPara="0" vert="horz" wrap="square" lIns="95250" tIns="95250" rIns="95250" bIns="95250" numCol="1" spcCol="1270" anchor="ctr" anchorCtr="0">
+        <a:bodyPr spcFirstLastPara="0" vert="horz" wrap="square" lIns="87630" tIns="87630" rIns="87630" bIns="87630" numCol="1" spcCol="1270" anchor="ctr" anchorCtr="0">
           <a:noAutofit/>
         </a:bodyPr>
         <a:lstStyle/>
         <a:p>
-          <a:pPr marL="0" lvl="0" indent="0" algn="l" defTabSz="1111250">
+          <a:pPr marL="0" lvl="0" indent="0" algn="l" defTabSz="1022350">
             <a:lnSpc>
               <a:spcPct val="90000"/>
             </a:lnSpc>
@@ -1564,14 +1672,14 @@
             <a:buNone/>
           </a:pPr>
           <a:r>
-            <a:rPr lang="en-US" sz="2500" kern="1200" dirty="0"/>
+            <a:rPr lang="en-US" sz="2300" kern="1200" dirty="0"/>
             <a:t>Features</a:t>
           </a:r>
         </a:p>
       </dsp:txBody>
       <dsp:txXfrm>
-        <a:off x="28557" y="40939"/>
-        <a:ext cx="7184888" cy="527886"/>
+        <a:off x="26273" y="108709"/>
+        <a:ext cx="7189456" cy="485654"/>
       </dsp:txXfrm>
     </dsp:sp>
     <dsp:sp modelId="{FD6F4898-D406-4525-8C27-F44675667C14}">
@@ -1581,8 +1689,8 @@
       </dsp:nvSpPr>
       <dsp:spPr>
         <a:xfrm>
-          <a:off x="0" y="597382"/>
-          <a:ext cx="7242002" cy="983250"/>
+          <a:off x="0" y="620636"/>
+          <a:ext cx="7242002" cy="880785"/>
         </a:xfrm>
         <a:prstGeom prst="rect">
           <a:avLst/>
@@ -1606,12 +1714,12 @@
         <a:fontRef idx="minor"/>
       </dsp:style>
       <dsp:txBody>
-        <a:bodyPr spcFirstLastPara="0" vert="horz" wrap="square" lIns="229934" tIns="31750" rIns="177800" bIns="31750" numCol="1" spcCol="1270" anchor="t" anchorCtr="0">
+        <a:bodyPr spcFirstLastPara="0" vert="horz" wrap="square" lIns="229934" tIns="29210" rIns="163576" bIns="29210" numCol="1" spcCol="1270" anchor="t" anchorCtr="0">
           <a:noAutofit/>
         </a:bodyPr>
         <a:lstStyle/>
         <a:p>
-          <a:pPr marL="228600" lvl="1" indent="-228600" algn="l" defTabSz="889000">
+          <a:pPr marL="171450" lvl="1" indent="-171450" algn="l" defTabSz="800100">
             <a:lnSpc>
               <a:spcPct val="90000"/>
             </a:lnSpc>
@@ -1624,12 +1732,12 @@
             <a:buChar char="•"/>
           </a:pPr>
           <a:r>
-            <a:rPr lang="en-US" sz="2000" kern="1200" dirty="0"/>
+            <a:rPr lang="en-US" sz="1800" kern="1200" dirty="0"/>
             <a:t>Scenario (Outline)</a:t>
           </a:r>
         </a:p>
         <a:p>
-          <a:pPr marL="228600" lvl="1" indent="-228600" algn="l" defTabSz="889000">
+          <a:pPr marL="171450" lvl="1" indent="-171450" algn="l" defTabSz="800100">
             <a:lnSpc>
               <a:spcPct val="90000"/>
             </a:lnSpc>
@@ -1642,12 +1750,12 @@
             <a:buChar char="•"/>
           </a:pPr>
           <a:r>
-            <a:rPr lang="en-US" sz="2000" kern="1200" dirty="0"/>
+            <a:rPr lang="en-US" sz="1800" kern="1200" dirty="0"/>
             <a:t>Steps</a:t>
           </a:r>
         </a:p>
         <a:p>
-          <a:pPr marL="228600" lvl="1" indent="-228600" algn="l" defTabSz="889000">
+          <a:pPr marL="171450" lvl="1" indent="-171450" algn="l" defTabSz="800100">
             <a:lnSpc>
               <a:spcPct val="90000"/>
             </a:lnSpc>
@@ -1660,14 +1768,14 @@
             <a:buChar char="•"/>
           </a:pPr>
           <a:r>
-            <a:rPr lang="en-US" sz="2000" kern="1200" dirty="0"/>
+            <a:rPr lang="en-US" sz="1800" kern="1200" dirty="0"/>
             <a:t>Gherkin</a:t>
           </a:r>
         </a:p>
       </dsp:txBody>
       <dsp:txXfrm>
-        <a:off x="0" y="597382"/>
-        <a:ext cx="7242002" cy="983250"/>
+        <a:off x="0" y="620636"/>
+        <a:ext cx="7242002" cy="880785"/>
       </dsp:txXfrm>
     </dsp:sp>
     <dsp:sp modelId="{251BEA11-C33B-4F72-A680-1C654876154D}">
@@ -1677,8 +1785,8 @@
       </dsp:nvSpPr>
       <dsp:spPr>
         <a:xfrm>
-          <a:off x="0" y="1580632"/>
-          <a:ext cx="7242002" cy="585000"/>
+          <a:off x="0" y="1501421"/>
+          <a:ext cx="7242002" cy="538200"/>
         </a:xfrm>
         <a:prstGeom prst="roundRect">
           <a:avLst/>
@@ -1719,12 +1827,12 @@
         </a:fontRef>
       </dsp:style>
       <dsp:txBody>
-        <a:bodyPr spcFirstLastPara="0" vert="horz" wrap="square" lIns="95250" tIns="95250" rIns="95250" bIns="95250" numCol="1" spcCol="1270" anchor="ctr" anchorCtr="0">
+        <a:bodyPr spcFirstLastPara="0" vert="horz" wrap="square" lIns="87630" tIns="87630" rIns="87630" bIns="87630" numCol="1" spcCol="1270" anchor="ctr" anchorCtr="0">
           <a:noAutofit/>
         </a:bodyPr>
         <a:lstStyle/>
         <a:p>
-          <a:pPr marL="0" lvl="0" indent="0" algn="l" defTabSz="1111250">
+          <a:pPr marL="0" lvl="0" indent="0" algn="l" defTabSz="1022350">
             <a:lnSpc>
               <a:spcPct val="90000"/>
             </a:lnSpc>
@@ -1737,14 +1845,14 @@
             <a:buNone/>
           </a:pPr>
           <a:r>
-            <a:rPr lang="en-US" sz="2500" kern="1200" dirty="0"/>
+            <a:rPr lang="en-US" sz="2300" kern="1200" dirty="0"/>
             <a:t>Glue Code</a:t>
           </a:r>
         </a:p>
       </dsp:txBody>
       <dsp:txXfrm>
-        <a:off x="28557" y="1609189"/>
-        <a:ext cx="7184888" cy="527886"/>
+        <a:off x="26273" y="1527694"/>
+        <a:ext cx="7189456" cy="485654"/>
       </dsp:txXfrm>
     </dsp:sp>
     <dsp:sp modelId="{F3C96160-65C9-4C60-966E-D24F33455ECD}">
@@ -1754,8 +1862,8 @@
       </dsp:nvSpPr>
       <dsp:spPr>
         <a:xfrm>
-          <a:off x="0" y="2165632"/>
-          <a:ext cx="7242002" cy="659812"/>
+          <a:off x="0" y="2039621"/>
+          <a:ext cx="7242002" cy="880785"/>
         </a:xfrm>
         <a:prstGeom prst="rect">
           <a:avLst/>
@@ -1779,12 +1887,12 @@
         <a:fontRef idx="minor"/>
       </dsp:style>
       <dsp:txBody>
-        <a:bodyPr spcFirstLastPara="0" vert="horz" wrap="square" lIns="229934" tIns="31750" rIns="177800" bIns="31750" numCol="1" spcCol="1270" anchor="t" anchorCtr="0">
+        <a:bodyPr spcFirstLastPara="0" vert="horz" wrap="square" lIns="229934" tIns="29210" rIns="163576" bIns="29210" numCol="1" spcCol="1270" anchor="t" anchorCtr="0">
           <a:noAutofit/>
         </a:bodyPr>
         <a:lstStyle/>
         <a:p>
-          <a:pPr marL="228600" lvl="1" indent="-228600" algn="l" defTabSz="889000">
+          <a:pPr marL="171450" lvl="1" indent="-171450" algn="l" defTabSz="800100">
             <a:lnSpc>
               <a:spcPct val="90000"/>
             </a:lnSpc>
@@ -1797,12 +1905,12 @@
             <a:buChar char="•"/>
           </a:pPr>
           <a:r>
-            <a:rPr lang="en-US" sz="2000" kern="1200" dirty="0"/>
+            <a:rPr lang="en-US" sz="1800" kern="1200" dirty="0"/>
             <a:t>Step Definitions</a:t>
           </a:r>
         </a:p>
         <a:p>
-          <a:pPr marL="228600" lvl="1" indent="-228600" algn="l" defTabSz="889000">
+          <a:pPr marL="171450" lvl="1" indent="-171450" algn="l" defTabSz="800100">
             <a:lnSpc>
               <a:spcPct val="90000"/>
             </a:lnSpc>
@@ -1815,25 +1923,64 @@
             <a:buChar char="•"/>
           </a:pPr>
           <a:r>
-            <a:rPr lang="en-US" sz="2000" kern="1200" dirty="0"/>
-            <a:t>(Page Objects)</a:t>
+            <a:rPr lang="en-US" sz="1800" kern="1200" dirty="0" err="1"/>
+            <a:t>Instrucciones</a:t>
           </a:r>
+          <a:r>
+            <a:rPr lang="en-US" sz="1800" kern="1200" dirty="0"/>
+            <a:t> de Selenium</a:t>
+          </a:r>
+        </a:p>
+        <a:p>
+          <a:pPr marL="171450" lvl="1" indent="-171450" algn="l" defTabSz="800100">
+            <a:lnSpc>
+              <a:spcPct val="90000"/>
+            </a:lnSpc>
+            <a:spcBef>
+              <a:spcPct val="0"/>
+            </a:spcBef>
+            <a:spcAft>
+              <a:spcPct val="20000"/>
+            </a:spcAft>
+            <a:buChar char="•"/>
+          </a:pPr>
+          <a:r>
+            <a:rPr lang="en-US" sz="1800" kern="1200" dirty="0" err="1"/>
+            <a:t>Patrones</a:t>
+          </a:r>
+          <a:r>
+            <a:rPr lang="en-US" sz="1800" kern="1200" dirty="0"/>
+            <a:t> de </a:t>
+          </a:r>
+          <a:r>
+            <a:rPr lang="en-US" sz="1800" kern="1200" dirty="0" err="1"/>
+            <a:t>Dise</a:t>
+          </a:r>
+          <a:r>
+            <a:rPr lang="es-MX" sz="1800" kern="1200" dirty="0" err="1"/>
+            <a:t>ño</a:t>
+          </a:r>
+          <a:r>
+            <a:rPr lang="es-MX" sz="1800" kern="1200" dirty="0"/>
+            <a:t> específicos</a:t>
+          </a:r>
+          <a:endParaRPr lang="en-US" sz="1800" kern="1200" dirty="0"/>
         </a:p>
       </dsp:txBody>
       <dsp:txXfrm>
-        <a:off x="0" y="2165632"/>
-        <a:ext cx="7242002" cy="659812"/>
+        <a:off x="0" y="2039621"/>
+        <a:ext cx="7242002" cy="880785"/>
       </dsp:txXfrm>
     </dsp:sp>
-    <dsp:sp modelId="{7EB3552E-28B8-407C-83A8-989B77563EF8}">
+    <dsp:sp modelId="{2C9232E3-5841-4541-B8CE-6E37C598E52A}">
       <dsp:nvSpPr>
         <dsp:cNvPr id="0" name=""/>
         <dsp:cNvSpPr/>
       </dsp:nvSpPr>
       <dsp:spPr>
         <a:xfrm>
-          <a:off x="0" y="2825445"/>
-          <a:ext cx="7242002" cy="585000"/>
+          <a:off x="0" y="2920406"/>
+          <a:ext cx="7242002" cy="538200"/>
         </a:xfrm>
         <a:prstGeom prst="roundRect">
           <a:avLst/>
@@ -1874,12 +2021,12 @@
         </a:fontRef>
       </dsp:style>
       <dsp:txBody>
-        <a:bodyPr spcFirstLastPara="0" vert="horz" wrap="square" lIns="95250" tIns="95250" rIns="95250" bIns="95250" numCol="1" spcCol="1270" anchor="ctr" anchorCtr="0">
+        <a:bodyPr spcFirstLastPara="0" vert="horz" wrap="square" lIns="87630" tIns="87630" rIns="87630" bIns="87630" numCol="1" spcCol="1270" anchor="ctr" anchorCtr="0">
           <a:noAutofit/>
         </a:bodyPr>
         <a:lstStyle/>
         <a:p>
-          <a:pPr marL="0" lvl="0" indent="0" algn="l" defTabSz="1111250">
+          <a:pPr marL="0" lvl="0" indent="0" algn="l" defTabSz="1022350">
             <a:lnSpc>
               <a:spcPct val="90000"/>
             </a:lnSpc>
@@ -1892,25 +2039,26 @@
             <a:buNone/>
           </a:pPr>
           <a:r>
-            <a:rPr lang="en-US" sz="2500" kern="1200" dirty="0"/>
-            <a:t>Selenium</a:t>
+            <a:rPr lang="en-US" sz="2300" kern="1200" dirty="0" err="1"/>
+            <a:t>Aplicacion</a:t>
           </a:r>
+          <a:endParaRPr lang="en-US" sz="2300" kern="1200" dirty="0"/>
         </a:p>
       </dsp:txBody>
       <dsp:txXfrm>
-        <a:off x="28557" y="2854002"/>
-        <a:ext cx="7184888" cy="527886"/>
+        <a:off x="26273" y="2946679"/>
+        <a:ext cx="7189456" cy="485654"/>
       </dsp:txXfrm>
     </dsp:sp>
-    <dsp:sp modelId="{9BAA238A-4C5D-4FF9-9B8C-893B575E6B50}">
+    <dsp:sp modelId="{A4AD1765-0261-4FB8-87AD-4C7C9C13670C}">
       <dsp:nvSpPr>
         <dsp:cNvPr id="0" name=""/>
         <dsp:cNvSpPr/>
       </dsp:nvSpPr>
       <dsp:spPr>
         <a:xfrm>
-          <a:off x="0" y="3410445"/>
-          <a:ext cx="7242002" cy="414000"/>
+          <a:off x="0" y="3458606"/>
+          <a:ext cx="7242002" cy="880785"/>
         </a:xfrm>
         <a:prstGeom prst="rect">
           <a:avLst/>
@@ -1934,12 +2082,12 @@
         <a:fontRef idx="minor"/>
       </dsp:style>
       <dsp:txBody>
-        <a:bodyPr spcFirstLastPara="0" vert="horz" wrap="square" lIns="229934" tIns="31750" rIns="177800" bIns="31750" numCol="1" spcCol="1270" anchor="t" anchorCtr="0">
+        <a:bodyPr spcFirstLastPara="0" vert="horz" wrap="square" lIns="229934" tIns="29210" rIns="163576" bIns="29210" numCol="1" spcCol="1270" anchor="t" anchorCtr="0">
           <a:noAutofit/>
         </a:bodyPr>
         <a:lstStyle/>
         <a:p>
-          <a:pPr marL="228600" lvl="1" indent="-228600" algn="l" defTabSz="889000">
+          <a:pPr marL="171450" lvl="1" indent="-171450" algn="l" defTabSz="800100">
             <a:lnSpc>
               <a:spcPct val="90000"/>
             </a:lnSpc>
@@ -1952,71 +2100,21 @@
             <a:buChar char="•"/>
           </a:pPr>
           <a:r>
-            <a:rPr lang="en-US" sz="2000" kern="1200" dirty="0"/>
-            <a:t>Page Objects</a:t>
+            <a:rPr lang="es-MX" sz="1800" kern="1200" dirty="0"/>
+            <a:t>Abrir</a:t>
           </a:r>
+          <a:r>
+            <a:rPr lang="es-MX" sz="1800" kern="1200"/>
+            <a:t>/Cerrar </a:t>
+          </a:r>
+          <a:r>
+            <a:rPr lang="es-MX" sz="1800" kern="1200" dirty="0"/>
+            <a:t>Browser</a:t>
+          </a:r>
+          <a:endParaRPr lang="en-US" sz="1800" kern="1200" dirty="0"/>
         </a:p>
-      </dsp:txBody>
-      <dsp:txXfrm>
-        <a:off x="0" y="3410445"/>
-        <a:ext cx="7242002" cy="414000"/>
-      </dsp:txXfrm>
-    </dsp:sp>
-    <dsp:sp modelId="{2C9232E3-5841-4541-B8CE-6E37C598E52A}">
-      <dsp:nvSpPr>
-        <dsp:cNvPr id="0" name=""/>
-        <dsp:cNvSpPr/>
-      </dsp:nvSpPr>
-      <dsp:spPr>
-        <a:xfrm>
-          <a:off x="0" y="3824445"/>
-          <a:ext cx="7242002" cy="585000"/>
-        </a:xfrm>
-        <a:prstGeom prst="roundRect">
-          <a:avLst/>
-        </a:prstGeom>
-        <a:solidFill>
-          <a:schemeClr val="accent1">
-            <a:hueOff val="0"/>
-            <a:satOff val="0"/>
-            <a:lumOff val="0"/>
-            <a:alphaOff val="0"/>
-          </a:schemeClr>
-        </a:solidFill>
-        <a:ln w="25400" cap="flat" cmpd="sng" algn="ctr">
-          <a:solidFill>
-            <a:schemeClr val="lt1">
-              <a:hueOff val="0"/>
-              <a:satOff val="0"/>
-              <a:lumOff val="0"/>
-              <a:alphaOff val="0"/>
-            </a:schemeClr>
-          </a:solidFill>
-          <a:prstDash val="solid"/>
-        </a:ln>
-        <a:effectLst/>
-      </dsp:spPr>
-      <dsp:style>
-        <a:lnRef idx="2">
-          <a:scrgbClr r="0" g="0" b="0"/>
-        </a:lnRef>
-        <a:fillRef idx="1">
-          <a:scrgbClr r="0" g="0" b="0"/>
-        </a:fillRef>
-        <a:effectRef idx="0">
-          <a:scrgbClr r="0" g="0" b="0"/>
-        </a:effectRef>
-        <a:fontRef idx="minor">
-          <a:schemeClr val="lt1"/>
-        </a:fontRef>
-      </dsp:style>
-      <dsp:txBody>
-        <a:bodyPr spcFirstLastPara="0" vert="horz" wrap="square" lIns="95250" tIns="95250" rIns="95250" bIns="95250" numCol="1" spcCol="1270" anchor="ctr" anchorCtr="0">
-          <a:noAutofit/>
-        </a:bodyPr>
-        <a:lstStyle/>
         <a:p>
-          <a:pPr marL="0" lvl="0" indent="0" algn="l" defTabSz="1111250">
+          <a:pPr marL="171450" lvl="1" indent="-171450" algn="l" defTabSz="800100">
             <a:lnSpc>
               <a:spcPct val="90000"/>
             </a:lnSpc>
@@ -2024,20 +2122,47 @@
               <a:spcPct val="0"/>
             </a:spcBef>
             <a:spcAft>
-              <a:spcPct val="35000"/>
+              <a:spcPct val="20000"/>
             </a:spcAft>
-            <a:buNone/>
+            <a:buChar char="•"/>
           </a:pPr>
           <a:r>
-            <a:rPr lang="en-US" sz="2500" kern="1200" dirty="0" err="1"/>
-            <a:t>Aplicacion</a:t>
+            <a:rPr lang="es-MX" sz="1800" kern="1200" dirty="0"/>
+            <a:t>Manipular </a:t>
           </a:r>
-          <a:endParaRPr lang="en-US" sz="2500" kern="1200" dirty="0"/>
+          <a:r>
+            <a:rPr lang="es-MX" sz="1800" kern="1200" dirty="0" err="1"/>
+            <a:t>WebElements</a:t>
+          </a:r>
+          <a:endParaRPr lang="en-US" sz="1800" kern="1200" dirty="0"/>
+        </a:p>
+        <a:p>
+          <a:pPr marL="171450" lvl="1" indent="-171450" algn="l" defTabSz="800100">
+            <a:lnSpc>
+              <a:spcPct val="90000"/>
+            </a:lnSpc>
+            <a:spcBef>
+              <a:spcPct val="0"/>
+            </a:spcBef>
+            <a:spcAft>
+              <a:spcPct val="20000"/>
+            </a:spcAft>
+            <a:buChar char="•"/>
+          </a:pPr>
+          <a:r>
+            <a:rPr lang="es-MX" sz="1800" kern="1200" dirty="0"/>
+            <a:t>Validar </a:t>
+          </a:r>
+          <a:r>
+            <a:rPr lang="es-MX" sz="1800" kern="1200" dirty="0" err="1"/>
+            <a:t>WebElements</a:t>
+          </a:r>
+          <a:endParaRPr lang="en-US" sz="1800" kern="1200" dirty="0"/>
         </a:p>
       </dsp:txBody>
       <dsp:txXfrm>
-        <a:off x="28557" y="3853002"/>
-        <a:ext cx="7184888" cy="527886"/>
+        <a:off x="0" y="3458606"/>
+        <a:ext cx="7242002" cy="880785"/>
       </dsp:txXfrm>
     </dsp:sp>
   </dsp:spTree>
@@ -23968,6 +24093,300 @@
 </p:sld>
 </file>
 
+<file path=ppt/slides/slide10.xml><?xml version="1.0" encoding="utf-8"?>
+<p:sld xmlns:a="http://schemas.openxmlformats.org/drawingml/2006/main" xmlns:r="http://schemas.openxmlformats.org/officeDocument/2006/relationships" xmlns:p="http://schemas.openxmlformats.org/presentationml/2006/main">
+  <p:cSld>
+    <p:spTree>
+      <p:nvGrpSpPr>
+        <p:cNvPr id="1" name=""/>
+        <p:cNvGrpSpPr/>
+        <p:nvPr/>
+      </p:nvGrpSpPr>
+      <p:grpSpPr>
+        <a:xfrm>
+          <a:off x="0" y="0"/>
+          <a:ext cx="0" cy="0"/>
+          <a:chOff x="0" y="0"/>
+          <a:chExt cx="0" cy="0"/>
+        </a:xfrm>
+      </p:grpSpPr>
+      <p:sp>
+        <p:nvSpPr>
+          <p:cNvPr id="2" name="Título 1">
+            <a:extLst>
+              <a:ext uri="{FF2B5EF4-FFF2-40B4-BE49-F238E27FC236}">
+                <a16:creationId xmlns:a16="http://schemas.microsoft.com/office/drawing/2014/main" id="{35141207-522F-4119-B2EC-8A80E53D2D1D}"/>
+              </a:ext>
+            </a:extLst>
+          </p:cNvPr>
+          <p:cNvSpPr>
+            <a:spLocks noGrp="1"/>
+          </p:cNvSpPr>
+          <p:nvPr>
+            <p:ph type="title"/>
+          </p:nvPr>
+        </p:nvSpPr>
+        <p:spPr/>
+        <p:txBody>
+          <a:bodyPr/>
+          <a:lstStyle/>
+          <a:p>
+            <a:r>
+              <a:rPr lang="es-MX" dirty="0" err="1"/>
+              <a:t>Glue</a:t>
+            </a:r>
+            <a:r>
+              <a:rPr lang="es-MX" dirty="0"/>
+              <a:t> </a:t>
+            </a:r>
+            <a:r>
+              <a:rPr lang="es-MX" dirty="0" err="1"/>
+              <a:t>Code</a:t>
+            </a:r>
+            <a:r>
+              <a:rPr lang="es-MX" dirty="0"/>
+              <a:t> en </a:t>
+            </a:r>
+            <a:r>
+              <a:rPr lang="es-MX" dirty="0" err="1"/>
+              <a:t>Scenario</a:t>
+            </a:r>
+            <a:r>
+              <a:rPr lang="es-MX" dirty="0"/>
+              <a:t> </a:t>
+            </a:r>
+            <a:r>
+              <a:rPr lang="es-MX" dirty="0" err="1"/>
+              <a:t>Outlines</a:t>
+            </a:r>
+            <a:endParaRPr lang="en-US" dirty="0"/>
+          </a:p>
+        </p:txBody>
+      </p:sp>
+      <p:pic>
+        <p:nvPicPr>
+          <p:cNvPr id="4" name="Imagen 3">
+            <a:extLst>
+              <a:ext uri="{FF2B5EF4-FFF2-40B4-BE49-F238E27FC236}">
+                <a16:creationId xmlns:a16="http://schemas.microsoft.com/office/drawing/2014/main" id="{CB07D7B3-9BAB-4EF4-B438-15C50A208C7E}"/>
+              </a:ext>
+            </a:extLst>
+          </p:cNvPr>
+          <p:cNvPicPr>
+            <a:picLocks noChangeAspect="1"/>
+          </p:cNvPicPr>
+          <p:nvPr/>
+        </p:nvPicPr>
+        <p:blipFill>
+          <a:blip r:embed="rId2"/>
+          <a:stretch>
+            <a:fillRect/>
+          </a:stretch>
+        </p:blipFill>
+        <p:spPr>
+          <a:xfrm>
+            <a:off x="1384730" y="2768600"/>
+            <a:ext cx="8762380" cy="1320800"/>
+          </a:xfrm>
+          <a:prstGeom prst="rect">
+            <a:avLst/>
+          </a:prstGeom>
+        </p:spPr>
+      </p:pic>
+    </p:spTree>
+    <p:extLst>
+      <p:ext uri="{BB962C8B-B14F-4D97-AF65-F5344CB8AC3E}">
+        <p14:creationId xmlns:p14="http://schemas.microsoft.com/office/powerpoint/2010/main" val="3686208683"/>
+      </p:ext>
+    </p:extLst>
+  </p:cSld>
+  <p:clrMapOvr>
+    <a:masterClrMapping/>
+  </p:clrMapOvr>
+</p:sld>
+</file>
+
+<file path=ppt/slides/slide11.xml><?xml version="1.0" encoding="utf-8"?>
+<p:sld xmlns:a="http://schemas.openxmlformats.org/drawingml/2006/main" xmlns:r="http://schemas.openxmlformats.org/officeDocument/2006/relationships" xmlns:p="http://schemas.openxmlformats.org/presentationml/2006/main">
+  <p:cSld>
+    <p:spTree>
+      <p:nvGrpSpPr>
+        <p:cNvPr id="1" name=""/>
+        <p:cNvGrpSpPr/>
+        <p:nvPr/>
+      </p:nvGrpSpPr>
+      <p:grpSpPr>
+        <a:xfrm>
+          <a:off x="0" y="0"/>
+          <a:ext cx="0" cy="0"/>
+          <a:chOff x="0" y="0"/>
+          <a:chExt cx="0" cy="0"/>
+        </a:xfrm>
+      </p:grpSpPr>
+      <p:sp>
+        <p:nvSpPr>
+          <p:cNvPr id="2" name="Título 1">
+            <a:extLst>
+              <a:ext uri="{FF2B5EF4-FFF2-40B4-BE49-F238E27FC236}">
+                <a16:creationId xmlns:a16="http://schemas.microsoft.com/office/drawing/2014/main" id="{9CCCE00C-490A-42D8-857B-F303107A8AE8}"/>
+              </a:ext>
+            </a:extLst>
+          </p:cNvPr>
+          <p:cNvSpPr>
+            <a:spLocks noGrp="1"/>
+          </p:cNvSpPr>
+          <p:nvPr>
+            <p:ph type="title"/>
+          </p:nvPr>
+        </p:nvSpPr>
+        <p:spPr/>
+        <p:txBody>
+          <a:bodyPr/>
+          <a:lstStyle/>
+          <a:p>
+            <a:r>
+              <a:rPr lang="en-US" dirty="0"/>
+              <a:t>Hooks</a:t>
+            </a:r>
+          </a:p>
+        </p:txBody>
+      </p:sp>
+      <p:sp>
+        <p:nvSpPr>
+          <p:cNvPr id="3" name="Marcador de texto 2">
+            <a:extLst>
+              <a:ext uri="{FF2B5EF4-FFF2-40B4-BE49-F238E27FC236}">
+                <a16:creationId xmlns:a16="http://schemas.microsoft.com/office/drawing/2014/main" id="{AEA92A48-0664-449F-9396-5EE4309A1E02}"/>
+              </a:ext>
+            </a:extLst>
+          </p:cNvPr>
+          <p:cNvSpPr>
+            <a:spLocks noGrp="1"/>
+          </p:cNvSpPr>
+          <p:nvPr>
+            <p:ph type="body" idx="1"/>
+          </p:nvPr>
+        </p:nvSpPr>
+        <p:spPr/>
+        <p:txBody>
+          <a:bodyPr/>
+          <a:lstStyle/>
+          <a:p>
+            <a:r>
+              <a:rPr lang="en-US" dirty="0" err="1"/>
+              <a:t>Ayudan</a:t>
+            </a:r>
+            <a:r>
+              <a:rPr lang="en-US" dirty="0"/>
+              <a:t> a </a:t>
+            </a:r>
+            <a:r>
+              <a:rPr lang="en-US" dirty="0" err="1"/>
+              <a:t>crear</a:t>
+            </a:r>
+            <a:r>
+              <a:rPr lang="en-US" dirty="0"/>
+              <a:t> </a:t>
+            </a:r>
+            <a:r>
+              <a:rPr lang="en-US" dirty="0" err="1"/>
+              <a:t>precondiciones</a:t>
+            </a:r>
+            <a:r>
+              <a:rPr lang="en-US" dirty="0"/>
+              <a:t> y a </a:t>
+            </a:r>
+            <a:r>
+              <a:rPr lang="en-US" dirty="0" err="1"/>
+              <a:t>terminar</a:t>
+            </a:r>
+            <a:r>
+              <a:rPr lang="en-US" dirty="0"/>
+              <a:t> el script.</a:t>
+            </a:r>
+          </a:p>
+          <a:p>
+            <a:r>
+              <a:rPr lang="en-US" dirty="0" err="1"/>
+              <a:t>Utilizan</a:t>
+            </a:r>
+            <a:r>
+              <a:rPr lang="en-US" dirty="0"/>
+              <a:t> palabras clave Before y After, </a:t>
+            </a:r>
+            <a:r>
+              <a:rPr lang="en-US" dirty="0" err="1"/>
+              <a:t>ejecutadas</a:t>
+            </a:r>
+            <a:r>
+              <a:rPr lang="en-US" dirty="0"/>
+              <a:t> antes y </a:t>
+            </a:r>
+            <a:r>
+              <a:rPr lang="en-US" dirty="0" err="1"/>
+              <a:t>despues</a:t>
+            </a:r>
+            <a:r>
+              <a:rPr lang="en-US" dirty="0"/>
+              <a:t> de </a:t>
+            </a:r>
+            <a:r>
+              <a:rPr lang="en-US" dirty="0" err="1"/>
+              <a:t>cada</a:t>
+            </a:r>
+            <a:r>
+              <a:rPr lang="en-US" dirty="0"/>
+              <a:t> Scenario (Outline)</a:t>
+            </a:r>
+          </a:p>
+          <a:p>
+            <a:endParaRPr lang="en-US" dirty="0"/>
+          </a:p>
+        </p:txBody>
+      </p:sp>
+      <p:pic>
+        <p:nvPicPr>
+          <p:cNvPr id="4" name="Imagen 3">
+            <a:extLst>
+              <a:ext uri="{FF2B5EF4-FFF2-40B4-BE49-F238E27FC236}">
+                <a16:creationId xmlns:a16="http://schemas.microsoft.com/office/drawing/2014/main" id="{DA808F90-0FD7-4F9F-A518-CCA9D5DBA0EC}"/>
+              </a:ext>
+            </a:extLst>
+          </p:cNvPr>
+          <p:cNvPicPr>
+            <a:picLocks noChangeAspect="1"/>
+          </p:cNvPicPr>
+          <p:nvPr/>
+        </p:nvPicPr>
+        <p:blipFill>
+          <a:blip r:embed="rId2"/>
+          <a:stretch>
+            <a:fillRect/>
+          </a:stretch>
+        </p:blipFill>
+        <p:spPr>
+          <a:xfrm>
+            <a:off x="3467809" y="3630342"/>
+            <a:ext cx="6897965" cy="2848279"/>
+          </a:xfrm>
+          <a:prstGeom prst="rect">
+            <a:avLst/>
+          </a:prstGeom>
+        </p:spPr>
+      </p:pic>
+    </p:spTree>
+    <p:extLst>
+      <p:ext uri="{BB962C8B-B14F-4D97-AF65-F5344CB8AC3E}">
+        <p14:creationId xmlns:p14="http://schemas.microsoft.com/office/powerpoint/2010/main" val="1131555498"/>
+      </p:ext>
+    </p:extLst>
+  </p:cSld>
+  <p:clrMapOvr>
+    <a:masterClrMapping/>
+  </p:clrMapOvr>
+</p:sld>
+</file>
+
 <file path=ppt/slides/slide2.xml><?xml version="1.0" encoding="utf-8"?>
 <p:sld xmlns:a="http://schemas.openxmlformats.org/drawingml/2006/main" xmlns:r="http://schemas.openxmlformats.org/officeDocument/2006/relationships" xmlns:p="http://schemas.openxmlformats.org/presentationml/2006/main">
   <p:cSld>
@@ -24035,19 +24454,19 @@
           <a:lstStyle/>
           <a:p>
             <a:r>
-              <a:rPr lang="en-US" dirty="0"/>
+              <a:rPr lang="en-US" b="1" dirty="0"/>
               <a:t>BDD</a:t>
             </a:r>
           </a:p>
           <a:p>
             <a:r>
-              <a:rPr lang="en-US" dirty="0"/>
+              <a:rPr lang="en-US" b="1" dirty="0"/>
               <a:t>Cucumber</a:t>
             </a:r>
           </a:p>
           <a:p>
             <a:r>
-              <a:rPr lang="en-US" dirty="0"/>
+              <a:rPr lang="en-US" b="1" dirty="0"/>
               <a:t>Cucumber/Java Demo</a:t>
             </a:r>
           </a:p>
@@ -24219,14 +24638,14 @@
               <a:t>Desarrolladores</a:t>
             </a:r>
             <a:r>
-              <a:rPr lang="en-US"/>
+              <a:rPr lang="en-US" dirty="0"/>
               <a:t>, </a:t>
             </a:r>
           </a:p>
           <a:p>
             <a:pPr lvl="1"/>
             <a:r>
-              <a:rPr lang="en-US"/>
+              <a:rPr lang="en-US" dirty="0" err="1"/>
               <a:t>Ingenieros</a:t>
             </a:r>
             <a:r>
@@ -24245,7 +24664,14 @@
           <a:p>
             <a:r>
               <a:rPr lang="en-US" dirty="0"/>
-              <a:t>Describe un </a:t>
+              <a:t>Describe:</a:t>
+            </a:r>
+          </a:p>
+          <a:p>
+            <a:pPr lvl="1"/>
+            <a:r>
+              <a:rPr lang="en-US" dirty="0"/>
+              <a:t> un </a:t>
             </a:r>
             <a:r>
               <a:rPr lang="en-US" dirty="0" err="1"/>
@@ -24269,15 +24695,7 @@
             </a:r>
             <a:r>
               <a:rPr lang="en-US" dirty="0"/>
-              <a:t> (Acceptance Criteria) </a:t>
-            </a:r>
-            <a:r>
-              <a:rPr lang="en-US" dirty="0" err="1"/>
-              <a:t>bien</a:t>
-            </a:r>
-            <a:r>
-              <a:rPr lang="en-US" dirty="0"/>
-              <a:t> </a:t>
+              <a:t> (Acceptance Criteria) bien </a:t>
             </a:r>
             <a:r>
               <a:rPr lang="en-US" dirty="0" err="1"/>
@@ -24286,6 +24704,13 @@
             <a:r>
               <a:rPr lang="en-US" dirty="0"/>
               <a:t>, </a:t>
+            </a:r>
+          </a:p>
+          <a:p>
+            <a:pPr lvl="1"/>
+            <a:r>
+              <a:rPr lang="en-US" dirty="0"/>
+              <a:t> </a:t>
             </a:r>
             <a:r>
               <a:rPr lang="en-US" dirty="0" err="1"/>
@@ -24301,15 +24726,7 @@
             </a:r>
             <a:r>
               <a:rPr lang="en-US" dirty="0"/>
-              <a:t> </a:t>
-            </a:r>
-            <a:r>
-              <a:rPr lang="en-US" dirty="0" err="1"/>
-              <a:t>es</a:t>
-            </a:r>
-            <a:r>
-              <a:rPr lang="en-US" dirty="0"/>
-              <a:t> la </a:t>
+              <a:t> es la </a:t>
             </a:r>
             <a:r>
               <a:rPr lang="en-US" dirty="0" err="1"/>
@@ -24317,15 +24734,7 @@
             </a:r>
             <a:r>
               <a:rPr lang="en-US" dirty="0"/>
-              <a:t> de software </a:t>
-            </a:r>
-            <a:r>
-              <a:rPr lang="en-US" dirty="0" err="1"/>
-              <a:t>bien</a:t>
-            </a:r>
-            <a:r>
-              <a:rPr lang="en-US" dirty="0"/>
-              <a:t> </a:t>
+              <a:t> de software bien </a:t>
             </a:r>
             <a:r>
               <a:rPr lang="en-US" dirty="0" err="1"/>
@@ -24333,6 +24742,13 @@
             </a:r>
             <a:r>
               <a:rPr lang="en-US" dirty="0"/>
+              <a:t> </a:t>
+            </a:r>
+          </a:p>
+          <a:p>
+            <a:pPr lvl="1"/>
+            <a:r>
+              <a:rPr lang="en-US"/>
               <a:t> que </a:t>
             </a:r>
             <a:r>
@@ -24425,7 +24841,7 @@
           <p:nvPr>
             <p:extLst>
               <p:ext uri="{D42A27DB-BD31-4B8C-83A1-F6EECF244321}">
-                <p14:modId xmlns:p14="http://schemas.microsoft.com/office/powerpoint/2010/main" val="957106252"/>
+                <p14:modId xmlns:p14="http://schemas.microsoft.com/office/powerpoint/2010/main" val="913913475"/>
               </p:ext>
             </p:extLst>
           </p:nvPr>
@@ -24609,7 +25025,7 @@
           <a:lstStyle/>
           <a:p>
             <a:r>
-              <a:rPr lang="es-MX" dirty="0" err="1"/>
+              <a:rPr lang="es-MX" b="1" dirty="0" err="1"/>
               <a:t>Feature</a:t>
             </a:r>
             <a:r>
@@ -24619,7 +25035,7 @@
           </a:p>
           <a:p>
             <a:r>
-              <a:rPr lang="es-MX" dirty="0" err="1"/>
+              <a:rPr lang="es-MX" b="1" dirty="0" err="1"/>
               <a:t>Scenario</a:t>
             </a:r>
             <a:r>
@@ -24629,8 +25045,12 @@
           </a:p>
           <a:p>
             <a:r>
+              <a:rPr lang="en-US" b="1" dirty="0"/>
+              <a:t>Given</a:t>
+            </a:r>
+            <a:r>
               <a:rPr lang="en-US" dirty="0"/>
-              <a:t>Given: </a:t>
+              <a:t>: </a:t>
             </a:r>
             <a:r>
               <a:rPr lang="en-US" dirty="0" err="1"/>
@@ -24672,8 +25092,12 @@
           </a:p>
           <a:p>
             <a:r>
+              <a:rPr lang="en-US" b="1" dirty="0"/>
+              <a:t>When</a:t>
+            </a:r>
+            <a:r>
               <a:rPr lang="en-US" dirty="0"/>
-              <a:t>When: Indica un </a:t>
+              <a:t>: Indica un </a:t>
             </a:r>
             <a:r>
               <a:rPr lang="en-US" dirty="0" err="1"/>
@@ -24715,8 +25139,12 @@
           </a:p>
           <a:p>
             <a:r>
+              <a:rPr lang="en-US" b="1" dirty="0"/>
+              <a:t>Then</a:t>
+            </a:r>
+            <a:r>
               <a:rPr lang="en-US" dirty="0"/>
-              <a:t>Then: Indica una </a:t>
+              <a:t>: Indica una </a:t>
             </a:r>
             <a:r>
               <a:rPr lang="en-US" dirty="0" err="1"/>
@@ -24761,8 +25189,12 @@
           </a:p>
           <a:p>
             <a:r>
+              <a:rPr lang="en-US" b="1" dirty="0"/>
+              <a:t>And</a:t>
+            </a:r>
+            <a:r>
               <a:rPr lang="en-US" dirty="0"/>
-              <a:t>And: </a:t>
+              <a:t>: </a:t>
             </a:r>
             <a:r>
               <a:rPr lang="en-US" dirty="0" err="1"/>
@@ -24799,8 +25231,12 @@
           </a:p>
           <a:p>
             <a:r>
+              <a:rPr lang="en-US" b="1" u="sng" dirty="0"/>
+              <a:t>But</a:t>
+            </a:r>
+            <a:r>
               <a:rPr lang="en-US" dirty="0"/>
-              <a:t>But: Lo </a:t>
+              <a:t>: Lo </a:t>
             </a:r>
             <a:r>
               <a:rPr lang="en-US" dirty="0" err="1"/>
@@ -25007,6 +25443,287 @@
           <p:cNvPr id="2" name="Título 1">
             <a:extLst>
               <a:ext uri="{FF2B5EF4-FFF2-40B4-BE49-F238E27FC236}">
+                <a16:creationId xmlns:a16="http://schemas.microsoft.com/office/drawing/2014/main" id="{5701049D-9B03-4C1B-B618-3E081351EA83}"/>
+              </a:ext>
+            </a:extLst>
+          </p:cNvPr>
+          <p:cNvSpPr>
+            <a:spLocks noGrp="1"/>
+          </p:cNvSpPr>
+          <p:nvPr>
+            <p:ph type="title"/>
+          </p:nvPr>
+        </p:nvSpPr>
+        <p:spPr/>
+        <p:txBody>
+          <a:bodyPr/>
+          <a:lstStyle/>
+          <a:p>
+            <a:r>
+              <a:rPr lang="en-US" dirty="0"/>
+              <a:t>Assertions</a:t>
+            </a:r>
+          </a:p>
+        </p:txBody>
+      </p:sp>
+      <p:sp>
+        <p:nvSpPr>
+          <p:cNvPr id="3" name="Marcador de texto 2">
+            <a:extLst>
+              <a:ext uri="{FF2B5EF4-FFF2-40B4-BE49-F238E27FC236}">
+                <a16:creationId xmlns:a16="http://schemas.microsoft.com/office/drawing/2014/main" id="{23CAD57B-E9B7-41F5-840C-F6FBD4C24E9B}"/>
+              </a:ext>
+            </a:extLst>
+          </p:cNvPr>
+          <p:cNvSpPr>
+            <a:spLocks noGrp="1"/>
+          </p:cNvSpPr>
+          <p:nvPr>
+            <p:ph type="body" idx="1"/>
+          </p:nvPr>
+        </p:nvSpPr>
+        <p:spPr/>
+        <p:txBody>
+          <a:bodyPr/>
+          <a:lstStyle/>
+          <a:p>
+            <a:r>
+              <a:rPr lang="en-US" dirty="0" err="1"/>
+              <a:t>Realiza</a:t>
+            </a:r>
+            <a:r>
+              <a:rPr lang="en-US" dirty="0"/>
+              <a:t> </a:t>
+            </a:r>
+            <a:r>
+              <a:rPr lang="en-US" dirty="0" err="1"/>
+              <a:t>verificaciones</a:t>
+            </a:r>
+            <a:r>
+              <a:rPr lang="en-US" dirty="0"/>
+              <a:t> </a:t>
+            </a:r>
+            <a:r>
+              <a:rPr lang="en-US" dirty="0" err="1"/>
+              <a:t>obligatorias</a:t>
+            </a:r>
+            <a:r>
+              <a:rPr lang="en-US" dirty="0"/>
+              <a:t>.</a:t>
+            </a:r>
+          </a:p>
+          <a:p>
+            <a:r>
+              <a:rPr lang="en-US" dirty="0" err="1"/>
+              <a:t>Detiene</a:t>
+            </a:r>
+            <a:r>
+              <a:rPr lang="en-US" dirty="0"/>
+              <a:t> la </a:t>
+            </a:r>
+            <a:r>
+              <a:rPr lang="en-US" dirty="0" err="1"/>
+              <a:t>ejecuci</a:t>
+            </a:r>
+            <a:r>
+              <a:rPr lang="es-MX" dirty="0" err="1"/>
+              <a:t>ón</a:t>
+            </a:r>
+            <a:r>
+              <a:rPr lang="es-MX" dirty="0"/>
+              <a:t> del caso de prueba cuando no se cumple.</a:t>
+            </a:r>
+          </a:p>
+          <a:p>
+            <a:r>
+              <a:rPr lang="en-US" dirty="0" err="1"/>
+              <a:t>Aserciones</a:t>
+            </a:r>
+            <a:r>
+              <a:rPr lang="en-US" dirty="0"/>
+              <a:t> mas communes:</a:t>
+            </a:r>
+          </a:p>
+          <a:p>
+            <a:pPr lvl="1"/>
+            <a:r>
+              <a:rPr lang="en-US" b="1" dirty="0" err="1"/>
+              <a:t>assertTrue</a:t>
+            </a:r>
+            <a:r>
+              <a:rPr lang="en-US" dirty="0"/>
+              <a:t>:   </a:t>
+            </a:r>
+            <a:r>
+              <a:rPr lang="en-US" i="1" dirty="0" err="1"/>
+              <a:t>assertTrue</a:t>
+            </a:r>
+            <a:r>
+              <a:rPr lang="en-US" i="1" dirty="0"/>
+              <a:t>(</a:t>
+            </a:r>
+            <a:r>
+              <a:rPr lang="en-US" i="1" dirty="0" err="1"/>
+              <a:t>loginButton.isDisplayed</a:t>
+            </a:r>
+            <a:r>
+              <a:rPr lang="en-US" i="1" dirty="0"/>
+              <a:t>());</a:t>
+            </a:r>
+          </a:p>
+          <a:p>
+            <a:pPr lvl="1"/>
+            <a:r>
+              <a:rPr lang="en-US" b="1" dirty="0" err="1"/>
+              <a:t>assertFalse</a:t>
+            </a:r>
+            <a:r>
+              <a:rPr lang="en-US" dirty="0"/>
+              <a:t>: </a:t>
+            </a:r>
+            <a:r>
+              <a:rPr lang="en-US" i="1" dirty="0" err="1"/>
+              <a:t>assertFalse</a:t>
+            </a:r>
+            <a:r>
+              <a:rPr lang="en-US" i="1" dirty="0"/>
+              <a:t>(</a:t>
+            </a:r>
+            <a:r>
+              <a:rPr lang="en-US" i="1" dirty="0" err="1"/>
+              <a:t>loginButton.isEnabled</a:t>
+            </a:r>
+            <a:r>
+              <a:rPr lang="en-US" i="1" dirty="0"/>
+              <a:t>());</a:t>
+            </a:r>
+          </a:p>
+          <a:p>
+            <a:pPr lvl="1"/>
+            <a:r>
+              <a:rPr lang="en-US" b="1" dirty="0" err="1"/>
+              <a:t>assertNull</a:t>
+            </a:r>
+            <a:r>
+              <a:rPr lang="en-US" dirty="0"/>
+              <a:t>, </a:t>
+            </a:r>
+            <a:r>
+              <a:rPr lang="en-US" dirty="0" err="1"/>
+              <a:t>assertNotNull</a:t>
+            </a:r>
+            <a:r>
+              <a:rPr lang="en-US" dirty="0"/>
+              <a:t>: </a:t>
+            </a:r>
+            <a:r>
+              <a:rPr lang="en-US" i="1" dirty="0" err="1"/>
+              <a:t>assertNotNull</a:t>
+            </a:r>
+            <a:r>
+              <a:rPr lang="en-US" i="1" dirty="0"/>
+              <a:t>(driver);</a:t>
+            </a:r>
+          </a:p>
+          <a:p>
+            <a:pPr lvl="1"/>
+            <a:r>
+              <a:rPr lang="en-US" b="1" dirty="0" err="1"/>
+              <a:t>assertSame</a:t>
+            </a:r>
+            <a:r>
+              <a:rPr lang="en-US" dirty="0"/>
+              <a:t>, </a:t>
+            </a:r>
+            <a:r>
+              <a:rPr lang="en-US" dirty="0" err="1"/>
+              <a:t>assertNotSame</a:t>
+            </a:r>
+            <a:r>
+              <a:rPr lang="en-US" dirty="0"/>
+              <a:t>: </a:t>
+            </a:r>
+            <a:r>
+              <a:rPr lang="en-US" i="1" dirty="0" err="1"/>
+              <a:t>assertSame</a:t>
+            </a:r>
+            <a:r>
+              <a:rPr lang="en-US" i="1" dirty="0"/>
+              <a:t>(</a:t>
+            </a:r>
+            <a:r>
+              <a:rPr lang="en-US" i="1" dirty="0" err="1"/>
+              <a:t>message.getText</a:t>
+            </a:r>
+            <a:r>
+              <a:rPr lang="en-US" i="1" dirty="0"/>
+              <a:t>(), “Login successful”);</a:t>
+            </a:r>
+          </a:p>
+          <a:p>
+            <a:pPr lvl="1"/>
+            <a:r>
+              <a:rPr lang="en-US" b="1" dirty="0" err="1"/>
+              <a:t>assertArrayEquals</a:t>
+            </a:r>
+            <a:r>
+              <a:rPr lang="en-US" dirty="0"/>
+              <a:t>: </a:t>
+            </a:r>
+            <a:r>
+              <a:rPr lang="en-US" i="1" dirty="0" err="1"/>
+              <a:t>assertArrayEquals</a:t>
+            </a:r>
+            <a:r>
+              <a:rPr lang="en-US" i="1" dirty="0"/>
+              <a:t>(</a:t>
+            </a:r>
+            <a:r>
+              <a:rPr lang="en-US" i="1" dirty="0" err="1"/>
+              <a:t>numbersArray</a:t>
+            </a:r>
+            <a:r>
+              <a:rPr lang="en-US" i="1" dirty="0"/>
+              <a:t>, {1, 2, 3});</a:t>
+            </a:r>
+          </a:p>
+        </p:txBody>
+      </p:sp>
+    </p:spTree>
+    <p:extLst>
+      <p:ext uri="{BB962C8B-B14F-4D97-AF65-F5344CB8AC3E}">
+        <p14:creationId xmlns:p14="http://schemas.microsoft.com/office/powerpoint/2010/main" val="124801642"/>
+      </p:ext>
+    </p:extLst>
+  </p:cSld>
+  <p:clrMapOvr>
+    <a:masterClrMapping/>
+  </p:clrMapOvr>
+</p:sld>
+</file>
+
+<file path=ppt/slides/slide9.xml><?xml version="1.0" encoding="utf-8"?>
+<p:sld xmlns:a="http://schemas.openxmlformats.org/drawingml/2006/main" xmlns:r="http://schemas.openxmlformats.org/officeDocument/2006/relationships" xmlns:p="http://schemas.openxmlformats.org/presentationml/2006/main">
+  <p:cSld>
+    <p:spTree>
+      <p:nvGrpSpPr>
+        <p:cNvPr id="1" name=""/>
+        <p:cNvGrpSpPr/>
+        <p:nvPr/>
+      </p:nvGrpSpPr>
+      <p:grpSpPr>
+        <a:xfrm>
+          <a:off x="0" y="0"/>
+          <a:ext cx="0" cy="0"/>
+          <a:chOff x="0" y="0"/>
+          <a:chExt cx="0" cy="0"/>
+        </a:xfrm>
+      </p:grpSpPr>
+      <p:sp>
+        <p:nvSpPr>
+          <p:cNvPr id="2" name="Título 1">
+            <a:extLst>
+              <a:ext uri="{FF2B5EF4-FFF2-40B4-BE49-F238E27FC236}">
                 <a16:creationId xmlns:a16="http://schemas.microsoft.com/office/drawing/2014/main" id="{3E59F2AE-A254-4F8F-8F6C-EFFB7B139E34}"/>
               </a:ext>
             </a:extLst>
@@ -25113,119 +25830,6 @@
     <p:extLst>
       <p:ext uri="{BB962C8B-B14F-4D97-AF65-F5344CB8AC3E}">
         <p14:creationId xmlns:p14="http://schemas.microsoft.com/office/powerpoint/2010/main" val="796345503"/>
-      </p:ext>
-    </p:extLst>
-  </p:cSld>
-  <p:clrMapOvr>
-    <a:masterClrMapping/>
-  </p:clrMapOvr>
-</p:sld>
-</file>
-
-<file path=ppt/slides/slide9.xml><?xml version="1.0" encoding="utf-8"?>
-<p:sld xmlns:a="http://schemas.openxmlformats.org/drawingml/2006/main" xmlns:r="http://schemas.openxmlformats.org/officeDocument/2006/relationships" xmlns:p="http://schemas.openxmlformats.org/presentationml/2006/main">
-  <p:cSld>
-    <p:spTree>
-      <p:nvGrpSpPr>
-        <p:cNvPr id="1" name=""/>
-        <p:cNvGrpSpPr/>
-        <p:nvPr/>
-      </p:nvGrpSpPr>
-      <p:grpSpPr>
-        <a:xfrm>
-          <a:off x="0" y="0"/>
-          <a:ext cx="0" cy="0"/>
-          <a:chOff x="0" y="0"/>
-          <a:chExt cx="0" cy="0"/>
-        </a:xfrm>
-      </p:grpSpPr>
-      <p:sp>
-        <p:nvSpPr>
-          <p:cNvPr id="2" name="Título 1">
-            <a:extLst>
-              <a:ext uri="{FF2B5EF4-FFF2-40B4-BE49-F238E27FC236}">
-                <a16:creationId xmlns:a16="http://schemas.microsoft.com/office/drawing/2014/main" id="{35141207-522F-4119-B2EC-8A80E53D2D1D}"/>
-              </a:ext>
-            </a:extLst>
-          </p:cNvPr>
-          <p:cNvSpPr>
-            <a:spLocks noGrp="1"/>
-          </p:cNvSpPr>
-          <p:nvPr>
-            <p:ph type="title"/>
-          </p:nvPr>
-        </p:nvSpPr>
-        <p:spPr/>
-        <p:txBody>
-          <a:bodyPr/>
-          <a:lstStyle/>
-          <a:p>
-            <a:r>
-              <a:rPr lang="es-MX" dirty="0" err="1"/>
-              <a:t>Glue</a:t>
-            </a:r>
-            <a:r>
-              <a:rPr lang="es-MX" dirty="0"/>
-              <a:t> </a:t>
-            </a:r>
-            <a:r>
-              <a:rPr lang="es-MX" dirty="0" err="1"/>
-              <a:t>Code</a:t>
-            </a:r>
-            <a:r>
-              <a:rPr lang="es-MX" dirty="0"/>
-              <a:t> en </a:t>
-            </a:r>
-            <a:r>
-              <a:rPr lang="es-MX" dirty="0" err="1"/>
-              <a:t>Scenario</a:t>
-            </a:r>
-            <a:r>
-              <a:rPr lang="es-MX" dirty="0"/>
-              <a:t> </a:t>
-            </a:r>
-            <a:r>
-              <a:rPr lang="es-MX" dirty="0" err="1"/>
-              <a:t>Outlines</a:t>
-            </a:r>
-            <a:endParaRPr lang="en-US" dirty="0"/>
-          </a:p>
-        </p:txBody>
-      </p:sp>
-      <p:pic>
-        <p:nvPicPr>
-          <p:cNvPr id="4" name="Imagen 3">
-            <a:extLst>
-              <a:ext uri="{FF2B5EF4-FFF2-40B4-BE49-F238E27FC236}">
-                <a16:creationId xmlns:a16="http://schemas.microsoft.com/office/drawing/2014/main" id="{CB07D7B3-9BAB-4EF4-B438-15C50A208C7E}"/>
-              </a:ext>
-            </a:extLst>
-          </p:cNvPr>
-          <p:cNvPicPr>
-            <a:picLocks noChangeAspect="1"/>
-          </p:cNvPicPr>
-          <p:nvPr/>
-        </p:nvPicPr>
-        <p:blipFill>
-          <a:blip r:embed="rId2"/>
-          <a:stretch>
-            <a:fillRect/>
-          </a:stretch>
-        </p:blipFill>
-        <p:spPr>
-          <a:xfrm>
-            <a:off x="1384730" y="2768600"/>
-            <a:ext cx="8762380" cy="1320800"/>
-          </a:xfrm>
-          <a:prstGeom prst="rect">
-            <a:avLst/>
-          </a:prstGeom>
-        </p:spPr>
-      </p:pic>
-    </p:spTree>
-    <p:extLst>
-      <p:ext uri="{BB962C8B-B14F-4D97-AF65-F5344CB8AC3E}">
-        <p14:creationId xmlns:p14="http://schemas.microsoft.com/office/powerpoint/2010/main" val="3686208683"/>
       </p:ext>
     </p:extLst>
   </p:cSld>

</xml_diff>